<commit_message>
finish report defect pptx
</commit_message>
<xml_diff>
--- a/PMSClient/StandardDocs/Target Defects Notification.pptx
+++ b/PMSClient/StandardDocs/Target Defects Notification.pptx
@@ -114,6 +114,18 @@
 </p:presentation>
 </file>
 
+<file path=ppt/commentAuthors.xml><?xml version="1.0" encoding="utf-8"?>
+<p:cmAuthorLst xmlns:a="http://schemas.openxmlformats.org/drawingml/2006/main" xmlns:r="http://schemas.openxmlformats.org/officeDocument/2006/relationships" xmlns:p="http://schemas.openxmlformats.org/presentationml/2006/main">
+  <p:cmAuthor id="1" name="zhou xs" initials="zx" lastIdx="1" clrIdx="0">
+    <p:extLst>
+      <p:ext uri="{19B8F6BF-5375-455C-9EA6-DF929625EA0E}">
+        <p15:presenceInfo xmlns:p15="http://schemas.microsoft.com/office/powerpoint/2012/main" userId="384606c39f073a96" providerId="Windows Live"/>
+      </p:ext>
+    </p:extLst>
+  </p:cmAuthor>
+</p:cmAuthorLst>
+</file>
+
 <file path=ppt/slideLayouts/slideLayout1.xml><?xml version="1.0" encoding="utf-8"?>
 <p:sldLayout xmlns:a="http://schemas.openxmlformats.org/drawingml/2006/main" xmlns:r="http://schemas.openxmlformats.org/officeDocument/2006/relationships" xmlns:p="http://schemas.openxmlformats.org/presentationml/2006/main" preserve="1" userDrawn="1">
   <p:cSld name="标题幻灯片">
@@ -966,47 +978,6 @@
       </p:grpSpPr>
       <p:sp>
         <p:nvSpPr>
-          <p:cNvPr id="2" name="标题 1">
-            <a:extLst>
-              <a:ext uri="{FF2B5EF4-FFF2-40B4-BE49-F238E27FC236}">
-                <a16:creationId xmlns:a16="http://schemas.microsoft.com/office/drawing/2014/main" id="{D8DC8D7A-9BCD-4552-B5CE-633B986F5AD6}"/>
-              </a:ext>
-            </a:extLst>
-          </p:cNvPr>
-          <p:cNvSpPr>
-            <a:spLocks noGrp="1"/>
-          </p:cNvSpPr>
-          <p:nvPr>
-            <p:ph type="title" hasCustomPrompt="1"/>
-          </p:nvPr>
-        </p:nvSpPr>
-        <p:spPr/>
-        <p:txBody>
-          <a:bodyPr/>
-          <a:lstStyle>
-            <a:lvl1pPr>
-              <a:defRPr>
-                <a:solidFill>
-                  <a:schemeClr val="tx1"/>
-                </a:solidFill>
-              </a:defRPr>
-            </a:lvl1pPr>
-          </a:lstStyle>
-          <a:p>
-            <a:r>
-              <a:rPr lang="zh-CN" altLang="en-US" dirty="0"/>
-              <a:t>单击这里填写比如</a:t>
-            </a:r>
-            <a:r>
-              <a:rPr lang="en-US" altLang="zh-CN" dirty="0"/>
-              <a:t>Se6Te2Sn1-200507-F-1</a:t>
-            </a:r>
-            <a:endParaRPr lang="zh-CN" altLang="en-US" dirty="0"/>
-          </a:p>
-        </p:txBody>
-      </p:sp>
-      <p:sp>
-        <p:nvSpPr>
           <p:cNvPr id="3" name="内容占位符 2">
             <a:extLst>
               <a:ext uri="{FF2B5EF4-FFF2-40B4-BE49-F238E27FC236}">
@@ -1021,7 +992,12 @@
             <p:ph idx="1" hasCustomPrompt="1"/>
           </p:nvPr>
         </p:nvSpPr>
-        <p:spPr/>
+        <p:spPr>
+          <a:xfrm>
+            <a:off x="838200" y="1112808"/>
+            <a:ext cx="10515600" cy="5064155"/>
+          </a:xfrm>
+        </p:spPr>
         <p:txBody>
           <a:bodyPr/>
           <a:lstStyle>
@@ -1135,6 +1111,42 @@
               <a:t>‹#›</a:t>
             </a:fld>
             <a:endParaRPr lang="zh-CN" altLang="en-US"/>
+          </a:p>
+        </p:txBody>
+      </p:sp>
+      <p:sp>
+        <p:nvSpPr>
+          <p:cNvPr id="8" name="文本框 7">
+            <a:extLst>
+              <a:ext uri="{FF2B5EF4-FFF2-40B4-BE49-F238E27FC236}">
+                <a16:creationId xmlns:a16="http://schemas.microsoft.com/office/drawing/2014/main" id="{102B0B33-D27B-4E6A-9D8C-772CF4D63D0F}"/>
+              </a:ext>
+            </a:extLst>
+          </p:cNvPr>
+          <p:cNvSpPr txBox="1"/>
+          <p:nvPr userDrawn="1"/>
+        </p:nvSpPr>
+        <p:spPr>
+          <a:xfrm>
+            <a:off x="838200" y="241540"/>
+            <a:ext cx="10515600" cy="584775"/>
+          </a:xfrm>
+          <a:prstGeom prst="rect">
+            <a:avLst/>
+          </a:prstGeom>
+          <a:noFill/>
+        </p:spPr>
+        <p:txBody>
+          <a:bodyPr wrap="square" rtlCol="0">
+            <a:spAutoFit/>
+          </a:bodyPr>
+          <a:lstStyle/>
+          <a:p>
+            <a:r>
+              <a:rPr lang="en-US" altLang="zh-CN" sz="3200" dirty="0"/>
+              <a:t>Target Basic Information</a:t>
+            </a:r>
+            <a:endParaRPr lang="zh-CN" altLang="en-US" sz="3200" dirty="0"/>
           </a:p>
         </p:txBody>
       </p:sp>
@@ -3784,7 +3796,25 @@
           <a:bodyPr/>
           <a:lstStyle/>
           <a:p>
-            <a:endParaRPr lang="zh-CN" altLang="en-US"/>
+            <a:r>
+              <a:rPr lang="en-US" altLang="zh-CN" dirty="0"/>
+              <a:t>[</a:t>
+            </a:r>
+            <a:r>
+              <a:rPr lang="en-US" altLang="zh-CN" dirty="0" err="1"/>
+              <a:t>maintitle</a:t>
+            </a:r>
+            <a:r>
+              <a:rPr lang="en-US" altLang="zh-CN" dirty="0"/>
+              <a:t>]</a:t>
+            </a:r>
+          </a:p>
+          <a:p>
+            <a:r>
+              <a:rPr lang="en-US" altLang="zh-CN"/>
+              <a:t>[today]</a:t>
+            </a:r>
+            <a:endParaRPr lang="zh-CN" altLang="en-US" dirty="0"/>
           </a:p>
         </p:txBody>
       </p:sp>
@@ -3820,18 +3850,18 @@
       </p:grpSpPr>
       <p:sp>
         <p:nvSpPr>
-          <p:cNvPr id="2" name="标题 1">
-            <a:extLst>
-              <a:ext uri="{FF2B5EF4-FFF2-40B4-BE49-F238E27FC236}">
-                <a16:creationId xmlns:a16="http://schemas.microsoft.com/office/drawing/2014/main" id="{EAF755FC-0B70-47DB-8F54-9253F6DBA085}"/>
-              </a:ext>
-            </a:extLst>
-          </p:cNvPr>
-          <p:cNvSpPr>
-            <a:spLocks noGrp="1"/>
-          </p:cNvSpPr>
-          <p:nvPr>
-            <p:ph type="title"/>
+          <p:cNvPr id="3" name="内容占位符 2">
+            <a:extLst>
+              <a:ext uri="{FF2B5EF4-FFF2-40B4-BE49-F238E27FC236}">
+                <a16:creationId xmlns:a16="http://schemas.microsoft.com/office/drawing/2014/main" id="{572C17D3-1431-4AAC-A345-8C83D09D9D8F}"/>
+              </a:ext>
+            </a:extLst>
+          </p:cNvPr>
+          <p:cNvSpPr>
+            <a:spLocks noGrp="1"/>
+          </p:cNvSpPr>
+          <p:nvPr>
+            <p:ph idx="1"/>
           </p:nvPr>
         </p:nvSpPr>
         <p:spPr/>
@@ -3839,32 +3869,63 @@
           <a:bodyPr/>
           <a:lstStyle/>
           <a:p>
-            <a:endParaRPr lang="zh-CN" altLang="en-US"/>
-          </a:p>
-        </p:txBody>
-      </p:sp>
-      <p:sp>
-        <p:nvSpPr>
-          <p:cNvPr id="3" name="内容占位符 2">
-            <a:extLst>
-              <a:ext uri="{FF2B5EF4-FFF2-40B4-BE49-F238E27FC236}">
-                <a16:creationId xmlns:a16="http://schemas.microsoft.com/office/drawing/2014/main" id="{572C17D3-1431-4AAC-A345-8C83D09D9D8F}"/>
-              </a:ext>
-            </a:extLst>
-          </p:cNvPr>
-          <p:cNvSpPr>
-            <a:spLocks noGrp="1"/>
-          </p:cNvSpPr>
-          <p:nvPr>
-            <p:ph idx="1"/>
-          </p:nvPr>
-        </p:nvSpPr>
-        <p:spPr/>
-        <p:txBody>
-          <a:bodyPr/>
-          <a:lstStyle/>
-          <a:p>
-            <a:endParaRPr lang="zh-CN" altLang="en-US"/>
+            <a:r>
+              <a:rPr lang="en-US" altLang="zh-CN" dirty="0" err="1"/>
+              <a:t>ProductID</a:t>
+            </a:r>
+            <a:r>
+              <a:rPr lang="en-US" altLang="zh-CN" dirty="0"/>
+              <a:t>:[</a:t>
+            </a:r>
+            <a:r>
+              <a:rPr lang="en-US" altLang="zh-CN" dirty="0" err="1"/>
+              <a:t>ProductID</a:t>
+            </a:r>
+            <a:r>
+              <a:rPr lang="en-US" altLang="zh-CN" dirty="0"/>
+              <a:t>]</a:t>
+            </a:r>
+          </a:p>
+          <a:p>
+            <a:r>
+              <a:rPr lang="en-US" altLang="zh-CN" dirty="0"/>
+              <a:t>Composition:[Composition]</a:t>
+            </a:r>
+            <a:endParaRPr lang="zh-CN" altLang="en-US" dirty="0"/>
+          </a:p>
+          <a:p>
+            <a:r>
+              <a:rPr lang="en-US" altLang="zh-CN" dirty="0"/>
+              <a:t>PO:[PO]</a:t>
+            </a:r>
+          </a:p>
+          <a:p>
+            <a:r>
+              <a:rPr lang="en-US" altLang="zh-CN" dirty="0"/>
+              <a:t>Dimension:[Dimension]</a:t>
+            </a:r>
+            <a:endParaRPr lang="zh-CN" altLang="en-US" dirty="0"/>
+          </a:p>
+          <a:p>
+            <a:r>
+              <a:rPr lang="en-US" altLang="zh-CN" dirty="0"/>
+              <a:t>Weight:[Weight]</a:t>
+            </a:r>
+            <a:endParaRPr lang="zh-CN" altLang="en-US" dirty="0"/>
+          </a:p>
+          <a:p>
+            <a:r>
+              <a:rPr lang="en-US" altLang="zh-CN" dirty="0"/>
+              <a:t>Density:[Density]</a:t>
+            </a:r>
+            <a:endParaRPr lang="zh-CN" altLang="en-US" dirty="0"/>
+          </a:p>
+          <a:p>
+            <a:r>
+              <a:rPr lang="en-US" altLang="zh-CN" dirty="0"/>
+              <a:t>Roughness:[Roughness]</a:t>
+            </a:r>
+            <a:endParaRPr lang="zh-CN" altLang="en-US" dirty="0"/>
           </a:p>
         </p:txBody>
       </p:sp>
@@ -3898,31 +3959,41 @@
           <a:chExt cx="0" cy="0"/>
         </a:xfrm>
       </p:grpSpPr>
-      <p:sp>
-        <p:nvSpPr>
-          <p:cNvPr id="2" name="内容占位符 1">
-            <a:extLst>
-              <a:ext uri="{FF2B5EF4-FFF2-40B4-BE49-F238E27FC236}">
-                <a16:creationId xmlns:a16="http://schemas.microsoft.com/office/drawing/2014/main" id="{1658200A-B6AF-42E9-82B1-D32973565BE2}"/>
-              </a:ext>
-            </a:extLst>
-          </p:cNvPr>
-          <p:cNvSpPr>
-            <a:spLocks noGrp="1"/>
-          </p:cNvSpPr>
+      <p:pic>
+        <p:nvPicPr>
+          <p:cNvPr id="4" name="内容占位符 3" descr="AAAAAA">
+            <a:extLst>
+              <a:ext uri="{FF2B5EF4-FFF2-40B4-BE49-F238E27FC236}">
+                <a16:creationId xmlns:a16="http://schemas.microsoft.com/office/drawing/2014/main" id="{BCED1EAA-6B5C-46C6-BEDF-3D3FA1CE003E}"/>
+              </a:ext>
+            </a:extLst>
+          </p:cNvPr>
+          <p:cNvPicPr>
+            <a:picLocks noGrp="1" noChangeAspect="1"/>
+          </p:cNvPicPr>
           <p:nvPr>
             <p:ph sz="quarter" idx="13"/>
           </p:nvPr>
-        </p:nvSpPr>
-        <p:spPr/>
-        <p:txBody>
-          <a:bodyPr/>
-          <a:lstStyle/>
-          <a:p>
-            <a:endParaRPr lang="zh-CN" altLang="en-US"/>
-          </a:p>
-        </p:txBody>
-      </p:sp>
+        </p:nvPicPr>
+        <p:blipFill>
+          <a:blip r:embed="rId2">
+            <a:extLst>
+              <a:ext uri="{28A0092B-C50C-407E-A947-70E740481C1C}">
+                <a14:useLocalDpi xmlns:a14="http://schemas.microsoft.com/office/drawing/2010/main" val="0"/>
+              </a:ext>
+            </a:extLst>
+          </a:blip>
+          <a:stretch>
+            <a:fillRect/>
+          </a:stretch>
+        </p:blipFill>
+        <p:spPr>
+          <a:xfrm>
+            <a:off x="2667000" y="0"/>
+            <a:ext cx="6858000" cy="6858000"/>
+          </a:xfrm>
+        </p:spPr>
+      </p:pic>
     </p:spTree>
     <p:extLst>
       <p:ext uri="{BB962C8B-B14F-4D97-AF65-F5344CB8AC3E}">

</xml_diff>